<commit_message>
expanded on BED section of tutorial 2_3
</commit_message>
<xml_diff>
--- a/assets/lectures/cshl/2019/mini/RNASeq_MiniLecture_02_03_SAM_BAM_BED.pptx
+++ b/assets/lectures/cshl/2019/mini/RNASeq_MiniLecture_02_03_SAM_BAM_BED.pptx
@@ -5,7 +5,7 @@
     <p:sldMasterId id="2147483674" r:id="rId1"/>
   </p:sldMasterIdLst>
   <p:notesMasterIdLst>
-    <p:notesMasterId r:id="rId17"/>
+    <p:notesMasterId r:id="rId18"/>
   </p:notesMasterIdLst>
   <p:sldIdLst>
     <p:sldId id="515" r:id="rId2"/>
@@ -17,12 +17,13 @@
     <p:sldId id="533" r:id="rId8"/>
     <p:sldId id="538" r:id="rId9"/>
     <p:sldId id="534" r:id="rId10"/>
-    <p:sldId id="535" r:id="rId11"/>
-    <p:sldId id="269" r:id="rId12"/>
-    <p:sldId id="310" r:id="rId13"/>
-    <p:sldId id="539" r:id="rId14"/>
-    <p:sldId id="309" r:id="rId15"/>
-    <p:sldId id="536" r:id="rId16"/>
+    <p:sldId id="540" r:id="rId11"/>
+    <p:sldId id="535" r:id="rId12"/>
+    <p:sldId id="269" r:id="rId13"/>
+    <p:sldId id="310" r:id="rId14"/>
+    <p:sldId id="539" r:id="rId15"/>
+    <p:sldId id="309" r:id="rId16"/>
+    <p:sldId id="536" r:id="rId17"/>
   </p:sldIdLst>
   <p:sldSz cx="12192000" cy="6858000"/>
   <p:notesSz cx="6858000" cy="9144000"/>
@@ -211,7 +212,7 @@
           <a:p>
             <a:fld id="{3F074802-55CA-9B40-9191-B744CF71FA91}" type="datetimeFigureOut">
               <a:rPr lang="en-US" smtClean="0"/>
-              <a:t>11/9/19</a:t>
+              <a:t>11/10/19</a:t>
             </a:fld>
             <a:endParaRPr lang="en-US"/>
           </a:p>
@@ -630,7 +631,7 @@
           <a:p>
             <a:fld id="{099D50AF-F628-504F-B99D-05BB4C0BF79D}" type="slidenum">
               <a:rPr lang="en-US" smtClean="0"/>
-              <a:t>14</a:t>
+              <a:t>15</a:t>
             </a:fld>
             <a:endParaRPr lang="en-US"/>
           </a:p>
@@ -1741,14 +1742,14 @@
           </a:ln>
           <a:extLst>
             <a:ext uri="{909E8E84-426E-40dd-AFC4-6F175D3DCCD1}">
-              <a14:hiddenFill xmlns="" xmlns:a14="http://schemas.microsoft.com/office/drawing/2010/main">
+              <a14:hiddenFill xmlns:a14="http://schemas.microsoft.com/office/drawing/2010/main" xmlns="">
                 <a:solidFill>
                   <a:srgbClr val="FFFFFF"/>
                 </a:solidFill>
               </a14:hiddenFill>
             </a:ext>
             <a:ext uri="{91240B29-F687-4f45-9708-019B960494DF}">
-              <a14:hiddenLine xmlns="" xmlns:a14="http://schemas.microsoft.com/office/drawing/2010/main" w="9525">
+              <a14:hiddenLine xmlns:a14="http://schemas.microsoft.com/office/drawing/2010/main" xmlns="" w="9525">
                 <a:solidFill>
                   <a:srgbClr val="000000"/>
                 </a:solidFill>
@@ -4788,14 +4789,14 @@
           </a:ln>
           <a:extLst>
             <a:ext uri="{909E8E84-426E-40dd-AFC4-6F175D3DCCD1}">
-              <a14:hiddenFill xmlns="" xmlns:a14="http://schemas.microsoft.com/office/drawing/2010/main">
+              <a14:hiddenFill xmlns:a14="http://schemas.microsoft.com/office/drawing/2010/main" xmlns="">
                 <a:solidFill>
                   <a:srgbClr val="FFFFFF"/>
                 </a:solidFill>
               </a14:hiddenFill>
             </a:ext>
             <a:ext uri="{91240B29-F687-4f45-9708-019B960494DF}">
-              <a14:hiddenLine xmlns="" xmlns:a14="http://schemas.microsoft.com/office/drawing/2010/main" w="9525">
+              <a14:hiddenLine xmlns:a14="http://schemas.microsoft.com/office/drawing/2010/main" xmlns="" w="9525">
                 <a:solidFill>
                   <a:srgbClr val="000000"/>
                 </a:solidFill>
@@ -5500,14 +5501,14 @@
           </a:ln>
           <a:extLst>
             <a:ext uri="{909E8E84-426E-40dd-AFC4-6F175D3DCCD1}">
-              <a14:hiddenFill xmlns="" xmlns:a14="http://schemas.microsoft.com/office/drawing/2010/main">
+              <a14:hiddenFill xmlns:a14="http://schemas.microsoft.com/office/drawing/2010/main" xmlns="">
                 <a:solidFill>
                   <a:srgbClr val="FFFFFF"/>
                 </a:solidFill>
               </a14:hiddenFill>
             </a:ext>
             <a:ext uri="{91240B29-F687-4f45-9708-019B960494DF}">
-              <a14:hiddenLine xmlns="" xmlns:a14="http://schemas.microsoft.com/office/drawing/2010/main" w="9525">
+              <a14:hiddenLine xmlns:a14="http://schemas.microsoft.com/office/drawing/2010/main" xmlns="" w="9525">
                 <a:solidFill>
                   <a:srgbClr val="000000"/>
                 </a:solidFill>
@@ -5998,6 +5999,261 @@
       </p:grpSpPr>
       <p:sp>
         <p:nvSpPr>
+          <p:cNvPr id="29697" name="Title 1"/>
+          <p:cNvSpPr>
+            <a:spLocks noGrp="1"/>
+          </p:cNvSpPr>
+          <p:nvPr>
+            <p:ph type="title"/>
+          </p:nvPr>
+        </p:nvSpPr>
+        <p:spPr>
+          <a:xfrm>
+            <a:off x="1676400" y="-17463"/>
+            <a:ext cx="8839200" cy="1143001"/>
+          </a:xfrm>
+        </p:spPr>
+        <p:txBody>
+          <a:bodyPr/>
+          <a:lstStyle/>
+          <a:p>
+            <a:pPr algn="ctr"/>
+            <a:r>
+              <a:rPr lang="en-US" b="1" dirty="0">
+                <a:latin typeface="Calibri" charset="0"/>
+                <a:ea typeface="ＭＳ Ｐゴシック" charset="0"/>
+              </a:rPr>
+              <a:t>Introduction to the BED format</a:t>
+            </a:r>
+          </a:p>
+        </p:txBody>
+      </p:sp>
+      <p:sp>
+        <p:nvSpPr>
+          <p:cNvPr id="28674" name="Content Placeholder 2"/>
+          <p:cNvSpPr>
+            <a:spLocks noGrp="1"/>
+          </p:cNvSpPr>
+          <p:nvPr>
+            <p:ph idx="1"/>
+          </p:nvPr>
+        </p:nvSpPr>
+        <p:spPr>
+          <a:xfrm>
+            <a:off x="883578" y="1106112"/>
+            <a:ext cx="10726220" cy="1973974"/>
+          </a:xfrm>
+        </p:spPr>
+        <p:txBody>
+          <a:bodyPr>
+            <a:normAutofit/>
+          </a:bodyPr>
+          <a:lstStyle/>
+          <a:p>
+            <a:pPr>
+              <a:defRPr/>
+            </a:pPr>
+            <a:r>
+              <a:rPr lang="en-US" dirty="0">
+                <a:latin typeface="Calibri" charset="0"/>
+                <a:ea typeface="ＭＳ Ｐゴシック" charset="0"/>
+              </a:rPr>
+              <a:t>There are several flavors of BED format: BED3, BED4, BED6, BED8, </a:t>
+            </a:r>
+            <a:r>
+              <a:rPr lang="en-US" dirty="0" err="1">
+                <a:latin typeface="Calibri" charset="0"/>
+                <a:ea typeface="ＭＳ Ｐゴシック" charset="0"/>
+              </a:rPr>
+              <a:t>etc</a:t>
+            </a:r>
+            <a:endParaRPr lang="en-US" dirty="0">
+              <a:latin typeface="Calibri" charset="0"/>
+              <a:ea typeface="ＭＳ Ｐゴシック" charset="0"/>
+            </a:endParaRPr>
+          </a:p>
+          <a:p>
+            <a:pPr>
+              <a:defRPr/>
+            </a:pPr>
+            <a:r>
+              <a:rPr lang="en-US" dirty="0">
+                <a:latin typeface="Calibri" charset="0"/>
+                <a:ea typeface="ＭＳ Ｐゴシック" charset="0"/>
+              </a:rPr>
+              <a:t>First 3 fields always required: </a:t>
+            </a:r>
+            <a:r>
+              <a:rPr lang="en-US" dirty="0" err="1">
+                <a:latin typeface="Calibri" charset="0"/>
+                <a:ea typeface="ＭＳ Ｐゴシック" charset="0"/>
+              </a:rPr>
+              <a:t>chr</a:t>
+            </a:r>
+            <a:r>
+              <a:rPr lang="en-US" dirty="0">
+                <a:latin typeface="Calibri" charset="0"/>
+                <a:ea typeface="ＭＳ Ｐゴシック" charset="0"/>
+              </a:rPr>
+              <a:t>, start, stop</a:t>
+            </a:r>
+          </a:p>
+          <a:p>
+            <a:pPr>
+              <a:defRPr/>
+            </a:pPr>
+            <a:r>
+              <a:rPr lang="en-US" dirty="0">
+                <a:latin typeface="Calibri" charset="0"/>
+                <a:ea typeface="ＭＳ Ｐゴシック" charset="0"/>
+              </a:rPr>
+              <a:t>Followed by up to 9 additional optional fields: name, score, strand, </a:t>
+            </a:r>
+            <a:r>
+              <a:rPr lang="en-US" dirty="0" err="1">
+                <a:latin typeface="Calibri" charset="0"/>
+                <a:ea typeface="ＭＳ Ｐゴシック" charset="0"/>
+              </a:rPr>
+              <a:t>thickStart</a:t>
+            </a:r>
+            <a:r>
+              <a:rPr lang="en-US" dirty="0">
+                <a:latin typeface="Calibri" charset="0"/>
+                <a:ea typeface="ＭＳ Ｐゴシック" charset="0"/>
+              </a:rPr>
+              <a:t>, </a:t>
+            </a:r>
+            <a:r>
+              <a:rPr lang="en-US" dirty="0" err="1">
+                <a:latin typeface="Calibri" charset="0"/>
+                <a:ea typeface="ＭＳ Ｐゴシック" charset="0"/>
+              </a:rPr>
+              <a:t>thickEnd</a:t>
+            </a:r>
+            <a:r>
+              <a:rPr lang="en-US" dirty="0">
+                <a:latin typeface="Calibri" charset="0"/>
+                <a:ea typeface="ＭＳ Ｐゴシック" charset="0"/>
+              </a:rPr>
+              <a:t>, </a:t>
+            </a:r>
+            <a:r>
+              <a:rPr lang="en-US" dirty="0" err="1">
+                <a:latin typeface="Calibri" charset="0"/>
+                <a:ea typeface="ＭＳ Ｐゴシック" charset="0"/>
+              </a:rPr>
+              <a:t>itemRGB</a:t>
+            </a:r>
+            <a:r>
+              <a:rPr lang="en-US" dirty="0">
+                <a:latin typeface="Calibri" charset="0"/>
+                <a:ea typeface="ＭＳ Ｐゴシック" charset="0"/>
+              </a:rPr>
+              <a:t>, </a:t>
+            </a:r>
+            <a:r>
+              <a:rPr lang="en-US" dirty="0" err="1">
+                <a:latin typeface="Calibri" charset="0"/>
+                <a:ea typeface="ＭＳ Ｐゴシック" charset="0"/>
+              </a:rPr>
+              <a:t>blockCount</a:t>
+            </a:r>
+            <a:r>
+              <a:rPr lang="en-US" dirty="0">
+                <a:latin typeface="Calibri" charset="0"/>
+                <a:ea typeface="ＭＳ Ｐゴシック" charset="0"/>
+              </a:rPr>
+              <a:t>, </a:t>
+            </a:r>
+            <a:r>
+              <a:rPr lang="en-US" dirty="0" err="1">
+                <a:latin typeface="Calibri" charset="0"/>
+                <a:ea typeface="ＭＳ Ｐゴシック" charset="0"/>
+              </a:rPr>
+              <a:t>blockSizes</a:t>
+            </a:r>
+            <a:r>
+              <a:rPr lang="en-US" dirty="0">
+                <a:latin typeface="Calibri" charset="0"/>
+                <a:ea typeface="ＭＳ Ｐゴシック" charset="0"/>
+              </a:rPr>
+              <a:t>, </a:t>
+            </a:r>
+            <a:r>
+              <a:rPr lang="en-US" dirty="0" err="1">
+                <a:latin typeface="Calibri" charset="0"/>
+                <a:ea typeface="ＭＳ Ｐゴシック" charset="0"/>
+              </a:rPr>
+              <a:t>blockStarts</a:t>
+            </a:r>
+            <a:endParaRPr lang="en-US" dirty="0">
+              <a:latin typeface="Calibri" charset="0"/>
+              <a:ea typeface="ＭＳ Ｐゴシック" charset="0"/>
+            </a:endParaRPr>
+          </a:p>
+        </p:txBody>
+      </p:sp>
+      <p:pic>
+        <p:nvPicPr>
+          <p:cNvPr id="3" name="Picture 2">
+            <a:extLst>
+              <a:ext uri="{FF2B5EF4-FFF2-40B4-BE49-F238E27FC236}">
+                <a16:creationId xmlns:a16="http://schemas.microsoft.com/office/drawing/2014/main" id="{8125D838-5297-0945-80F5-3407A9FED6AF}"/>
+              </a:ext>
+            </a:extLst>
+          </p:cNvPr>
+          <p:cNvPicPr>
+            <a:picLocks noChangeAspect="1"/>
+          </p:cNvPicPr>
+          <p:nvPr/>
+        </p:nvPicPr>
+        <p:blipFill rotWithShape="1">
+          <a:blip r:embed="rId2"/>
+          <a:srcRect t="27350" r="71649"/>
+          <a:stretch/>
+        </p:blipFill>
+        <p:spPr>
+          <a:xfrm>
+            <a:off x="2291145" y="3316705"/>
+            <a:ext cx="6836816" cy="2907314"/>
+          </a:xfrm>
+          <a:prstGeom prst="rect">
+            <a:avLst/>
+          </a:prstGeom>
+        </p:spPr>
+      </p:pic>
+    </p:spTree>
+    <p:extLst>
+      <p:ext uri="{BB962C8B-B14F-4D97-AF65-F5344CB8AC3E}">
+        <p14:creationId xmlns:p14="http://schemas.microsoft.com/office/powerpoint/2010/main" val="113569703"/>
+      </p:ext>
+    </p:extLst>
+  </p:cSld>
+  <p:clrMapOvr>
+    <a:masterClrMapping/>
+  </p:clrMapOvr>
+</p:sld>
+</file>
+
+<file path=ppt/slides/slide11.xml><?xml version="1.0" encoding="utf-8"?>
+<p:sld xmlns:a="http://schemas.openxmlformats.org/drawingml/2006/main" xmlns:r="http://schemas.openxmlformats.org/officeDocument/2006/relationships" xmlns:p="http://schemas.openxmlformats.org/presentationml/2006/main">
+  <p:cSld>
+    <p:spTree>
+      <p:nvGrpSpPr>
+        <p:cNvPr id="1" name=""/>
+        <p:cNvGrpSpPr/>
+        <p:nvPr/>
+      </p:nvGrpSpPr>
+      <p:grpSpPr>
+        <a:xfrm>
+          <a:off x="0" y="0"/>
+          <a:ext cx="0" cy="0"/>
+          <a:chOff x="0" y="0"/>
+          <a:chExt cx="0" cy="0"/>
+        </a:xfrm>
+      </p:grpSpPr>
+      <p:sp>
+        <p:nvSpPr>
           <p:cNvPr id="30721" name="Title 1"/>
           <p:cNvSpPr>
             <a:spLocks noGrp="1"/>
@@ -6202,7 +6458,7 @@
 </p:sld>
 </file>
 
-<file path=ppt/slides/slide11.xml><?xml version="1.0" encoding="utf-8"?>
+<file path=ppt/slides/slide12.xml><?xml version="1.0" encoding="utf-8"?>
 <p:sld xmlns:a="http://schemas.openxmlformats.org/drawingml/2006/main" xmlns:r="http://schemas.openxmlformats.org/officeDocument/2006/relationships" xmlns:p="http://schemas.openxmlformats.org/presentationml/2006/main">
   <p:cSld>
     <p:spTree>
@@ -6335,7 +6591,7 @@
 </p:sld>
 </file>
 
-<file path=ppt/slides/slide12.xml><?xml version="1.0" encoding="utf-8"?>
+<file path=ppt/slides/slide13.xml><?xml version="1.0" encoding="utf-8"?>
 <p:sld xmlns:a="http://schemas.openxmlformats.org/drawingml/2006/main" xmlns:r="http://schemas.openxmlformats.org/officeDocument/2006/relationships" xmlns:p="http://schemas.openxmlformats.org/presentationml/2006/main">
   <p:cSld>
     <p:spTree>
@@ -9759,7 +10015,7 @@
 </p:sld>
 </file>
 
-<file path=ppt/slides/slide13.xml><?xml version="1.0" encoding="utf-8"?>
+<file path=ppt/slides/slide14.xml><?xml version="1.0" encoding="utf-8"?>
 <p:sld xmlns:a="http://schemas.openxmlformats.org/drawingml/2006/main" xmlns:r="http://schemas.openxmlformats.org/officeDocument/2006/relationships" xmlns:p="http://schemas.openxmlformats.org/presentationml/2006/main">
   <p:cSld>
     <p:spTree>
@@ -9950,7 +10206,7 @@
         <p:spPr>
           <a:xfrm>
             <a:off x="500065" y="1362367"/>
-            <a:ext cx="5300663" cy="3170099"/>
+            <a:ext cx="5300663" cy="3293209"/>
           </a:xfrm>
           <a:prstGeom prst="rect">
             <a:avLst/>
@@ -9964,26 +10220,26 @@
           <a:lstStyle/>
           <a:p>
             <a:r>
-              <a:rPr lang="en-US" sz="2800" b="1" dirty="0">
+              <a:rPr lang="en-US" sz="2400" b="1" dirty="0">
                 <a:latin typeface="Calibri" panose="020F0502020204030204" pitchFamily="34" charset="0"/>
                 <a:cs typeface="Calibri" panose="020F0502020204030204" pitchFamily="34" charset="0"/>
               </a:rPr>
               <a:t>Reference Genome builds</a:t>
             </a:r>
             <a:br>
-              <a:rPr lang="en-US" sz="2800" b="1" dirty="0">
+              <a:rPr lang="en-US" sz="2400" b="1" dirty="0">
                 <a:latin typeface="Calibri" panose="020F0502020204030204" pitchFamily="34" charset="0"/>
                 <a:cs typeface="Calibri" panose="020F0502020204030204" pitchFamily="34" charset="0"/>
               </a:rPr>
             </a:br>
-            <a:endParaRPr lang="en-US" sz="2800" b="1" dirty="0">
+            <a:endParaRPr lang="en-US" sz="2400" b="1" dirty="0">
               <a:latin typeface="Calibri" panose="020F0502020204030204" pitchFamily="34" charset="0"/>
               <a:cs typeface="Calibri" panose="020F0502020204030204" pitchFamily="34" charset="0"/>
             </a:endParaRPr>
           </a:p>
           <a:p>
             <a:r>
-              <a:rPr lang="en-US" sz="2400" dirty="0">
+              <a:rPr lang="en-US" sz="2000" dirty="0">
                 <a:latin typeface="Calibri" panose="020F0502020204030204" pitchFamily="34" charset="0"/>
                 <a:cs typeface="Calibri" panose="020F0502020204030204" pitchFamily="34" charset="0"/>
               </a:rPr>
@@ -9992,45 +10248,51 @@
           </a:p>
           <a:p>
             <a:r>
-              <a:rPr lang="en-US" sz="2400" dirty="0">
+              <a:rPr lang="en-US" sz="2000" dirty="0">
                 <a:latin typeface="Calibri" panose="020F0502020204030204" pitchFamily="34" charset="0"/>
                 <a:cs typeface="Calibri" panose="020F0502020204030204" pitchFamily="34" charset="0"/>
               </a:rPr>
-              <a:t>           alternate:  GRCh38v2_ccdg</a:t>
+              <a:t>alternates:  GRCh38v2_ccdg, GRCh38_full_analysis_set_plus_decoy_hla</a:t>
             </a:r>
             <a:br>
-              <a:rPr lang="en-US" sz="2400" dirty="0">
+              <a:rPr lang="en-US" sz="2000" dirty="0">
                 <a:latin typeface="Calibri" panose="020F0502020204030204" pitchFamily="34" charset="0"/>
                 <a:cs typeface="Calibri" panose="020F0502020204030204" pitchFamily="34" charset="0"/>
               </a:rPr>
             </a:br>
             <a:br>
-              <a:rPr lang="en-US" sz="2400" dirty="0">
+              <a:rPr lang="en-US" sz="2000" dirty="0">
                 <a:latin typeface="Calibri" panose="020F0502020204030204" pitchFamily="34" charset="0"/>
                 <a:cs typeface="Calibri" panose="020F0502020204030204" pitchFamily="34" charset="0"/>
               </a:rPr>
             </a:br>
-            <a:r>
-              <a:rPr lang="en-US" sz="2400" dirty="0">
+            <a:br>
+              <a:rPr lang="en-US" sz="2000" dirty="0">
                 <a:latin typeface="Calibri" panose="020F0502020204030204" pitchFamily="34" charset="0"/>
                 <a:cs typeface="Calibri" panose="020F0502020204030204" pitchFamily="34" charset="0"/>
               </a:rPr>
-              <a:t>Previous human: GRCh37, hg19, b37</a:t>
-            </a:r>
-            <a:br>
-              <a:rPr lang="en-US" sz="2400" dirty="0">
+            </a:br>
+            <a:r>
+              <a:rPr lang="en-US" sz="2000" dirty="0">
                 <a:latin typeface="Calibri" panose="020F0502020204030204" pitchFamily="34" charset="0"/>
                 <a:cs typeface="Calibri" panose="020F0502020204030204" pitchFamily="34" charset="0"/>
               </a:rPr>
+              <a:t>Previous human: GRCh37, hg19, b37</a:t>
+            </a:r>
+            <a:br>
+              <a:rPr lang="en-US" sz="2000" dirty="0">
+                <a:latin typeface="Calibri" panose="020F0502020204030204" pitchFamily="34" charset="0"/>
+                <a:cs typeface="Calibri" panose="020F0502020204030204" pitchFamily="34" charset="0"/>
+              </a:rPr>
             </a:br>
             <a:br>
-              <a:rPr lang="en-US" sz="2400" dirty="0">
+              <a:rPr lang="en-US" sz="2000" dirty="0">
                 <a:latin typeface="Calibri" panose="020F0502020204030204" pitchFamily="34" charset="0"/>
                 <a:cs typeface="Calibri" panose="020F0502020204030204" pitchFamily="34" charset="0"/>
               </a:rPr>
             </a:br>
             <a:r>
-              <a:rPr lang="en-US" sz="2400" dirty="0">
+              <a:rPr lang="en-US" sz="2000" dirty="0">
                 <a:latin typeface="Calibri" panose="020F0502020204030204" pitchFamily="34" charset="0"/>
                 <a:cs typeface="Calibri" panose="020F0502020204030204" pitchFamily="34" charset="0"/>
               </a:rPr>
@@ -10090,7 +10352,7 @@
 </p:sld>
 </file>
 
-<file path=ppt/slides/slide14.xml><?xml version="1.0" encoding="utf-8"?>
+<file path=ppt/slides/slide15.xml><?xml version="1.0" encoding="utf-8"?>
 <p:sld xmlns:a="http://schemas.openxmlformats.org/drawingml/2006/main" xmlns:r="http://schemas.openxmlformats.org/officeDocument/2006/relationships" xmlns:p="http://schemas.openxmlformats.org/presentationml/2006/main">
   <p:cSld>
     <p:spTree>
@@ -10256,7 +10518,7 @@
 </p:sld>
 </file>
 
-<file path=ppt/slides/slide15.xml><?xml version="1.0" encoding="utf-8"?>
+<file path=ppt/slides/slide16.xml><?xml version="1.0" encoding="utf-8"?>
 <p:sld xmlns:a="http://schemas.openxmlformats.org/drawingml/2006/main" xmlns:r="http://schemas.openxmlformats.org/officeDocument/2006/relationships" xmlns:p="http://schemas.openxmlformats.org/presentationml/2006/main">
   <p:cSld>
     <p:spTree>
@@ -10543,14 +10805,14 @@
           </a:ln>
           <a:extLst>
             <a:ext uri="{909E8E84-426E-40dd-AFC4-6F175D3DCCD1}">
-              <a14:hiddenFill xmlns="" xmlns:a14="http://schemas.microsoft.com/office/drawing/2010/main">
+              <a14:hiddenFill xmlns:a14="http://schemas.microsoft.com/office/drawing/2010/main" xmlns="">
                 <a:solidFill>
                   <a:srgbClr val="FFFFFF"/>
                 </a:solidFill>
               </a14:hiddenFill>
             </a:ext>
             <a:ext uri="{91240B29-F687-4f45-9708-019B960494DF}">
-              <a14:hiddenLine xmlns="" xmlns:a14="http://schemas.microsoft.com/office/drawing/2010/main" w="9525">
+              <a14:hiddenLine xmlns:a14="http://schemas.microsoft.com/office/drawing/2010/main" xmlns="" w="9525">
                 <a:solidFill>
                   <a:srgbClr val="000000"/>
                 </a:solidFill>
@@ -10584,14 +10846,14 @@
           </a:ln>
           <a:extLst>
             <a:ext uri="{909E8E84-426E-40dd-AFC4-6F175D3DCCD1}">
-              <a14:hiddenFill xmlns="" xmlns:a14="http://schemas.microsoft.com/office/drawing/2010/main">
+              <a14:hiddenFill xmlns:a14="http://schemas.microsoft.com/office/drawing/2010/main" xmlns="">
                 <a:solidFill>
                   <a:srgbClr val="FFFFFF"/>
                 </a:solidFill>
               </a14:hiddenFill>
             </a:ext>
             <a:ext uri="{91240B29-F687-4f45-9708-019B960494DF}">
-              <a14:hiddenLine xmlns="" xmlns:a14="http://schemas.microsoft.com/office/drawing/2010/main" w="9525">
+              <a14:hiddenLine xmlns:a14="http://schemas.microsoft.com/office/drawing/2010/main" xmlns="" w="9525">
                 <a:solidFill>
                   <a:srgbClr val="000000"/>
                 </a:solidFill>
@@ -10745,14 +11007,14 @@
           </a:ln>
           <a:extLst>
             <a:ext uri="{909E8E84-426E-40dd-AFC4-6F175D3DCCD1}">
-              <a14:hiddenFill xmlns="" xmlns:a14="http://schemas.microsoft.com/office/drawing/2010/main">
+              <a14:hiddenFill xmlns:a14="http://schemas.microsoft.com/office/drawing/2010/main" xmlns="">
                 <a:solidFill>
                   <a:srgbClr val="FFFFFF"/>
                 </a:solidFill>
               </a14:hiddenFill>
             </a:ext>
             <a:ext uri="{91240B29-F687-4f45-9708-019B960494DF}">
-              <a14:hiddenLine xmlns="" xmlns:a14="http://schemas.microsoft.com/office/drawing/2010/main" w="9525">
+              <a14:hiddenLine xmlns:a14="http://schemas.microsoft.com/office/drawing/2010/main" xmlns="" w="9525">
                 <a:solidFill>
                   <a:srgbClr val="000000"/>
                 </a:solidFill>
@@ -12124,14 +12386,14 @@
           </a:ln>
           <a:extLst>
             <a:ext uri="{909E8E84-426E-40dd-AFC4-6F175D3DCCD1}">
-              <a14:hiddenFill xmlns="" xmlns:a14="http://schemas.microsoft.com/office/drawing/2010/main">
+              <a14:hiddenFill xmlns:a14="http://schemas.microsoft.com/office/drawing/2010/main" xmlns="">
                 <a:solidFill>
                   <a:srgbClr val="FFFFFF"/>
                 </a:solidFill>
               </a14:hiddenFill>
             </a:ext>
             <a:ext uri="{91240B29-F687-4f45-9708-019B960494DF}">
-              <a14:hiddenLine xmlns="" xmlns:a14="http://schemas.microsoft.com/office/drawing/2010/main" w="9525">
+              <a14:hiddenLine xmlns:a14="http://schemas.microsoft.com/office/drawing/2010/main" xmlns="" w="9525">
                 <a:solidFill>
                   <a:srgbClr val="000000"/>
                 </a:solidFill>
@@ -12419,14 +12681,14 @@
           </a:ln>
           <a:extLst>
             <a:ext uri="{909E8E84-426E-40dd-AFC4-6F175D3DCCD1}">
-              <a14:hiddenFill xmlns="" xmlns:a14="http://schemas.microsoft.com/office/drawing/2010/main">
+              <a14:hiddenFill xmlns:a14="http://schemas.microsoft.com/office/drawing/2010/main" xmlns="">
                 <a:solidFill>
                   <a:srgbClr val="FFFFFF"/>
                 </a:solidFill>
               </a14:hiddenFill>
             </a:ext>
             <a:ext uri="{91240B29-F687-4f45-9708-019B960494DF}">
-              <a14:hiddenLine xmlns="" xmlns:a14="http://schemas.microsoft.com/office/drawing/2010/main" w="9525">
+              <a14:hiddenLine xmlns:a14="http://schemas.microsoft.com/office/drawing/2010/main" xmlns="" w="9525">
                 <a:solidFill>
                   <a:srgbClr val="000000"/>
                 </a:solidFill>
@@ -12792,14 +13054,14 @@
           </a:ln>
           <a:extLst>
             <a:ext uri="{909E8E84-426E-40dd-AFC4-6F175D3DCCD1}">
-              <a14:hiddenFill xmlns="" xmlns:a14="http://schemas.microsoft.com/office/drawing/2010/main">
+              <a14:hiddenFill xmlns:a14="http://schemas.microsoft.com/office/drawing/2010/main" xmlns="">
                 <a:solidFill>
                   <a:srgbClr val="FFFFFF"/>
                 </a:solidFill>
               </a14:hiddenFill>
             </a:ext>
             <a:ext uri="{91240B29-F687-4f45-9708-019B960494DF}">
-              <a14:hiddenLine xmlns="" xmlns:a14="http://schemas.microsoft.com/office/drawing/2010/main" w="9525">
+              <a14:hiddenLine xmlns:a14="http://schemas.microsoft.com/office/drawing/2010/main" xmlns="" w="9525">
                 <a:solidFill>
                   <a:srgbClr val="000000"/>
                 </a:solidFill>
@@ -13447,7 +13709,7 @@
                 <a:latin typeface="Calibri" charset="0"/>
                 <a:ea typeface="ＭＳ Ｐゴシック" charset="0"/>
               </a:rPr>
-              <a:t>Chromosome name, start position, end position</a:t>
+              <a:t>Chromosome name, start position, end position (BED3)</a:t>
             </a:r>
           </a:p>
           <a:p>

</xml_diff>